<commit_message>
Organise files and directories.
</commit_message>
<xml_diff>
--- a/assets/doc/Order Manager design.pptx
+++ b/assets/doc/Order Manager design.pptx
@@ -288,7 +288,8 @@
           <a:p>
             <a:fld id="{CB1F00AD-6633-42DB-B428-306A8200A2A3}" type="datetimeFigureOut">
               <a:rPr lang="en-US" smtClean="0"/>
-              <a:t>4/19/2025</a:t>
+              <a:pPr/>
+              <a:t>4/27/2025</a:t>
             </a:fld>
             <a:endParaRPr lang="en-US"/>
           </a:p>
@@ -330,6 +331,7 @@
           <a:p>
             <a:fld id="{15F3575A-130F-4749-AC26-2AB6A23A3CD8}" type="slidenum">
               <a:rPr lang="en-US" smtClean="0"/>
+              <a:pPr/>
               <a:t>‹#›</a:t>
             </a:fld>
             <a:endParaRPr lang="en-US"/>
@@ -453,7 +455,8 @@
           <a:p>
             <a:fld id="{CB1F00AD-6633-42DB-B428-306A8200A2A3}" type="datetimeFigureOut">
               <a:rPr lang="en-US" smtClean="0"/>
-              <a:t>4/19/2025</a:t>
+              <a:pPr/>
+              <a:t>4/27/2025</a:t>
             </a:fld>
             <a:endParaRPr lang="en-US"/>
           </a:p>
@@ -495,6 +498,7 @@
           <a:p>
             <a:fld id="{15F3575A-130F-4749-AC26-2AB6A23A3CD8}" type="slidenum">
               <a:rPr lang="en-US" smtClean="0"/>
+              <a:pPr/>
               <a:t>‹#›</a:t>
             </a:fld>
             <a:endParaRPr lang="en-US"/>
@@ -628,7 +632,8 @@
           <a:p>
             <a:fld id="{CB1F00AD-6633-42DB-B428-306A8200A2A3}" type="datetimeFigureOut">
               <a:rPr lang="en-US" smtClean="0"/>
-              <a:t>4/19/2025</a:t>
+              <a:pPr/>
+              <a:t>4/27/2025</a:t>
             </a:fld>
             <a:endParaRPr lang="en-US"/>
           </a:p>
@@ -670,6 +675,7 @@
           <a:p>
             <a:fld id="{15F3575A-130F-4749-AC26-2AB6A23A3CD8}" type="slidenum">
               <a:rPr lang="en-US" smtClean="0"/>
+              <a:pPr/>
               <a:t>‹#›</a:t>
             </a:fld>
             <a:endParaRPr lang="en-US"/>
@@ -793,7 +799,8 @@
           <a:p>
             <a:fld id="{CB1F00AD-6633-42DB-B428-306A8200A2A3}" type="datetimeFigureOut">
               <a:rPr lang="en-US" smtClean="0"/>
-              <a:t>4/19/2025</a:t>
+              <a:pPr/>
+              <a:t>4/27/2025</a:t>
             </a:fld>
             <a:endParaRPr lang="en-US"/>
           </a:p>
@@ -835,6 +842,7 @@
           <a:p>
             <a:fld id="{15F3575A-130F-4749-AC26-2AB6A23A3CD8}" type="slidenum">
               <a:rPr lang="en-US" smtClean="0"/>
+              <a:pPr/>
               <a:t>‹#›</a:t>
             </a:fld>
             <a:endParaRPr lang="en-US"/>
@@ -1034,7 +1042,8 @@
           <a:p>
             <a:fld id="{CB1F00AD-6633-42DB-B428-306A8200A2A3}" type="datetimeFigureOut">
               <a:rPr lang="en-US" smtClean="0"/>
-              <a:t>4/19/2025</a:t>
+              <a:pPr/>
+              <a:t>4/27/2025</a:t>
             </a:fld>
             <a:endParaRPr lang="en-US"/>
           </a:p>
@@ -1076,6 +1085,7 @@
           <a:p>
             <a:fld id="{15F3575A-130F-4749-AC26-2AB6A23A3CD8}" type="slidenum">
               <a:rPr lang="en-US" smtClean="0"/>
+              <a:pPr/>
               <a:t>‹#›</a:t>
             </a:fld>
             <a:endParaRPr lang="en-US"/>
@@ -1317,7 +1327,8 @@
           <a:p>
             <a:fld id="{CB1F00AD-6633-42DB-B428-306A8200A2A3}" type="datetimeFigureOut">
               <a:rPr lang="en-US" smtClean="0"/>
-              <a:t>4/19/2025</a:t>
+              <a:pPr/>
+              <a:t>4/27/2025</a:t>
             </a:fld>
             <a:endParaRPr lang="en-US"/>
           </a:p>
@@ -1359,6 +1370,7 @@
           <a:p>
             <a:fld id="{15F3575A-130F-4749-AC26-2AB6A23A3CD8}" type="slidenum">
               <a:rPr lang="en-US" smtClean="0"/>
+              <a:pPr/>
               <a:t>‹#›</a:t>
             </a:fld>
             <a:endParaRPr lang="en-US"/>
@@ -1734,7 +1746,8 @@
           <a:p>
             <a:fld id="{CB1F00AD-6633-42DB-B428-306A8200A2A3}" type="datetimeFigureOut">
               <a:rPr lang="en-US" smtClean="0"/>
-              <a:t>4/19/2025</a:t>
+              <a:pPr/>
+              <a:t>4/27/2025</a:t>
             </a:fld>
             <a:endParaRPr lang="en-US"/>
           </a:p>
@@ -1776,6 +1789,7 @@
           <a:p>
             <a:fld id="{15F3575A-130F-4749-AC26-2AB6A23A3CD8}" type="slidenum">
               <a:rPr lang="en-US" smtClean="0"/>
+              <a:pPr/>
               <a:t>‹#›</a:t>
             </a:fld>
             <a:endParaRPr lang="en-US"/>
@@ -1847,7 +1861,8 @@
           <a:p>
             <a:fld id="{CB1F00AD-6633-42DB-B428-306A8200A2A3}" type="datetimeFigureOut">
               <a:rPr lang="en-US" smtClean="0"/>
-              <a:t>4/19/2025</a:t>
+              <a:pPr/>
+              <a:t>4/27/2025</a:t>
             </a:fld>
             <a:endParaRPr lang="en-US"/>
           </a:p>
@@ -1889,6 +1904,7 @@
           <a:p>
             <a:fld id="{15F3575A-130F-4749-AC26-2AB6A23A3CD8}" type="slidenum">
               <a:rPr lang="en-US" smtClean="0"/>
+              <a:pPr/>
               <a:t>‹#›</a:t>
             </a:fld>
             <a:endParaRPr lang="en-US"/>
@@ -1937,7 +1953,8 @@
           <a:p>
             <a:fld id="{CB1F00AD-6633-42DB-B428-306A8200A2A3}" type="datetimeFigureOut">
               <a:rPr lang="en-US" smtClean="0"/>
-              <a:t>4/19/2025</a:t>
+              <a:pPr/>
+              <a:t>4/27/2025</a:t>
             </a:fld>
             <a:endParaRPr lang="en-US"/>
           </a:p>
@@ -1979,6 +1996,7 @@
           <a:p>
             <a:fld id="{15F3575A-130F-4749-AC26-2AB6A23A3CD8}" type="slidenum">
               <a:rPr lang="en-US" smtClean="0"/>
+              <a:pPr/>
               <a:t>‹#›</a:t>
             </a:fld>
             <a:endParaRPr lang="en-US"/>
@@ -2209,7 +2227,8 @@
           <a:p>
             <a:fld id="{CB1F00AD-6633-42DB-B428-306A8200A2A3}" type="datetimeFigureOut">
               <a:rPr lang="en-US" smtClean="0"/>
-              <a:t>4/19/2025</a:t>
+              <a:pPr/>
+              <a:t>4/27/2025</a:t>
             </a:fld>
             <a:endParaRPr lang="en-US"/>
           </a:p>
@@ -2251,6 +2270,7 @@
           <a:p>
             <a:fld id="{15F3575A-130F-4749-AC26-2AB6A23A3CD8}" type="slidenum">
               <a:rPr lang="en-US" smtClean="0"/>
+              <a:pPr/>
               <a:t>‹#›</a:t>
             </a:fld>
             <a:endParaRPr lang="en-US"/>
@@ -2457,7 +2477,8 @@
           <a:p>
             <a:fld id="{CB1F00AD-6633-42DB-B428-306A8200A2A3}" type="datetimeFigureOut">
               <a:rPr lang="en-US" smtClean="0"/>
-              <a:t>4/19/2025</a:t>
+              <a:pPr/>
+              <a:t>4/27/2025</a:t>
             </a:fld>
             <a:endParaRPr lang="en-US"/>
           </a:p>
@@ -2499,6 +2520,7 @@
           <a:p>
             <a:fld id="{15F3575A-130F-4749-AC26-2AB6A23A3CD8}" type="slidenum">
               <a:rPr lang="en-US" smtClean="0"/>
+              <a:pPr/>
               <a:t>‹#›</a:t>
             </a:fld>
             <a:endParaRPr lang="en-US"/>
@@ -2665,7 +2687,8 @@
           <a:p>
             <a:fld id="{CB1F00AD-6633-42DB-B428-306A8200A2A3}" type="datetimeFigureOut">
               <a:rPr lang="en-US" smtClean="0"/>
-              <a:t>4/19/2025</a:t>
+              <a:pPr/>
+              <a:t>4/27/2025</a:t>
             </a:fld>
             <a:endParaRPr lang="en-US"/>
           </a:p>
@@ -2743,6 +2766,7 @@
           <a:p>
             <a:fld id="{15F3575A-130F-4749-AC26-2AB6A23A3CD8}" type="slidenum">
               <a:rPr lang="en-US" smtClean="0"/>
+              <a:pPr/>
               <a:t>‹#›</a:t>
             </a:fld>
             <a:endParaRPr lang="en-US"/>
@@ -3183,8 +3207,8 @@
         </p:nvSpPr>
         <p:spPr>
           <a:xfrm>
-            <a:off x="3143240" y="3714752"/>
-            <a:ext cx="285752" cy="2000264"/>
+            <a:off x="3143240" y="3429000"/>
+            <a:ext cx="285752" cy="2286016"/>
           </a:xfrm>
           <a:prstGeom prst="rect">
             <a:avLst/>
@@ -3303,8 +3327,8 @@
         </p:nvSpPr>
         <p:spPr>
           <a:xfrm>
-            <a:off x="785786" y="5857892"/>
-            <a:ext cx="1500198" cy="369332"/>
+            <a:off x="642910" y="5857892"/>
+            <a:ext cx="2000264" cy="369332"/>
           </a:xfrm>
           <a:prstGeom prst="rect">
             <a:avLst/>
@@ -3319,7 +3343,11 @@
           <a:p>
             <a:r>
               <a:rPr lang="de-DE" dirty="0" smtClean="0"/>
-              <a:t>API Gateway</a:t>
+              <a:t>API </a:t>
+            </a:r>
+            <a:r>
+              <a:rPr lang="de-DE" dirty="0" smtClean="0"/>
+              <a:t>Gateway (Java)</a:t>
             </a:r>
             <a:endParaRPr lang="en-US" dirty="0"/>
           </a:p>
@@ -3334,7 +3362,7 @@
         <p:spPr>
           <a:xfrm>
             <a:off x="2571736" y="1285860"/>
-            <a:ext cx="1428760" cy="369332"/>
+            <a:ext cx="1643074" cy="369332"/>
           </a:xfrm>
           <a:prstGeom prst="rect">
             <a:avLst/>
@@ -3349,7 +3377,7 @@
           <a:p>
             <a:r>
               <a:rPr lang="de-DE" dirty="0" smtClean="0"/>
-              <a:t>Product</a:t>
+              <a:t>Product (Kotlin)</a:t>
             </a:r>
             <a:endParaRPr lang="en-US" dirty="0"/>
           </a:p>
@@ -3364,7 +3392,7 @@
         <p:spPr>
           <a:xfrm>
             <a:off x="2857488" y="5857892"/>
-            <a:ext cx="1071570" cy="369332"/>
+            <a:ext cx="1357322" cy="369332"/>
           </a:xfrm>
           <a:prstGeom prst="rect">
             <a:avLst/>
@@ -3379,7 +3407,7 @@
           <a:p>
             <a:r>
               <a:rPr lang="de-DE" dirty="0" smtClean="0"/>
-              <a:t>Order</a:t>
+              <a:t>Order (Java)</a:t>
             </a:r>
             <a:endParaRPr lang="en-US" dirty="0"/>
           </a:p>
@@ -3394,7 +3422,7 @@
         <p:spPr>
           <a:xfrm>
             <a:off x="5143504" y="5786454"/>
-            <a:ext cx="1428760" cy="369332"/>
+            <a:ext cx="1857388" cy="369332"/>
           </a:xfrm>
           <a:prstGeom prst="rect">
             <a:avLst/>
@@ -3409,7 +3437,7 @@
           <a:p>
             <a:r>
               <a:rPr lang="de-DE" dirty="0" smtClean="0"/>
-              <a:t>Notification</a:t>
+              <a:t>Notification (Java)</a:t>
             </a:r>
             <a:endParaRPr lang="en-US" dirty="0"/>
           </a:p>
@@ -3423,7 +3451,7 @@
         </p:nvCxnSpPr>
         <p:spPr>
           <a:xfrm>
-            <a:off x="3428992" y="5286388"/>
+            <a:off x="3428992" y="5000636"/>
             <a:ext cx="2357454" cy="1588"/>
           </a:xfrm>
           <a:prstGeom prst="straightConnector1">
@@ -3456,7 +3484,7 @@
         </p:nvSpPr>
         <p:spPr>
           <a:xfrm>
-            <a:off x="3714744" y="4929198"/>
+            <a:off x="3714744" y="4643446"/>
             <a:ext cx="2071702" cy="369332"/>
           </a:xfrm>
           <a:prstGeom prst="rect">
@@ -3486,7 +3514,7 @@
         </p:nvCxnSpPr>
         <p:spPr>
           <a:xfrm>
-            <a:off x="3428992" y="3857628"/>
+            <a:off x="3428992" y="3500438"/>
             <a:ext cx="2357454" cy="1588"/>
           </a:xfrm>
           <a:prstGeom prst="straightConnector1">
@@ -3519,7 +3547,7 @@
         </p:nvSpPr>
         <p:spPr>
           <a:xfrm>
-            <a:off x="3857620" y="3500438"/>
+            <a:off x="3857620" y="3143248"/>
             <a:ext cx="2071702" cy="369332"/>
           </a:xfrm>
           <a:prstGeom prst="rect">
@@ -3549,8 +3577,8 @@
         </p:nvSpPr>
         <p:spPr>
           <a:xfrm>
-            <a:off x="5500694" y="2000240"/>
-            <a:ext cx="1571636" cy="369332"/>
+            <a:off x="5143504" y="1925413"/>
+            <a:ext cx="1928826" cy="646331"/>
           </a:xfrm>
           <a:prstGeom prst="rect">
             <a:avLst/>
@@ -3565,8 +3593,11 @@
           <a:p>
             <a:r>
               <a:rPr lang="de-DE" dirty="0" smtClean="0"/>
-              <a:t>Inventory</a:t>
-            </a:r>
+              <a:t>Inventory (Java)</a:t>
+            </a:r>
+            <a:endParaRPr lang="en-US" dirty="0" smtClean="0"/>
+          </a:p>
+          <a:p>
             <a:endParaRPr lang="en-US" dirty="0"/>
           </a:p>
         </p:txBody>
@@ -3579,7 +3610,7 @@
         </p:nvSpPr>
         <p:spPr>
           <a:xfrm>
-            <a:off x="3929058" y="5357826"/>
+            <a:off x="4143372" y="3571876"/>
             <a:ext cx="1500198" cy="369332"/>
           </a:xfrm>
           <a:prstGeom prst="rect">
@@ -3595,7 +3626,7 @@
           <a:p>
             <a:r>
               <a:rPr lang="de-DE" dirty="0" smtClean="0"/>
-              <a:t>Kafka MQ</a:t>
+              <a:t>HTTP API</a:t>
             </a:r>
             <a:endParaRPr lang="en-US" dirty="0"/>
           </a:p>
@@ -3722,6 +3753,222 @@
           </a:p>
         </p:txBody>
       </p:sp>
+      <p:sp>
+        <p:nvSpPr>
+          <p:cNvPr id="24" name="TextBox 23"/>
+          <p:cNvSpPr txBox="1"/>
+          <p:nvPr/>
+        </p:nvSpPr>
+        <p:spPr>
+          <a:xfrm>
+            <a:off x="1928794" y="2214554"/>
+            <a:ext cx="1500198" cy="369332"/>
+          </a:xfrm>
+          <a:prstGeom prst="rect">
+            <a:avLst/>
+          </a:prstGeom>
+          <a:noFill/>
+        </p:spPr>
+        <p:txBody>
+          <a:bodyPr wrap="square" rtlCol="0">
+            <a:spAutoFit/>
+          </a:bodyPr>
+          <a:lstStyle/>
+          <a:p>
+            <a:r>
+              <a:rPr lang="de-DE" dirty="0" smtClean="0"/>
+              <a:t>REST API</a:t>
+            </a:r>
+            <a:endParaRPr lang="en-US" dirty="0"/>
+          </a:p>
+        </p:txBody>
+      </p:sp>
+      <p:sp>
+        <p:nvSpPr>
+          <p:cNvPr id="26" name="TextBox 25"/>
+          <p:cNvSpPr txBox="1"/>
+          <p:nvPr/>
+        </p:nvSpPr>
+        <p:spPr>
+          <a:xfrm>
+            <a:off x="1857356" y="3857628"/>
+            <a:ext cx="1500198" cy="369332"/>
+          </a:xfrm>
+          <a:prstGeom prst="rect">
+            <a:avLst/>
+          </a:prstGeom>
+          <a:noFill/>
+        </p:spPr>
+        <p:txBody>
+          <a:bodyPr wrap="square" rtlCol="0">
+            <a:spAutoFit/>
+          </a:bodyPr>
+          <a:lstStyle/>
+          <a:p>
+            <a:r>
+              <a:rPr lang="de-DE" dirty="0" smtClean="0"/>
+              <a:t>REST API</a:t>
+            </a:r>
+            <a:endParaRPr lang="en-US" dirty="0"/>
+          </a:p>
+        </p:txBody>
+      </p:sp>
+      <p:sp>
+        <p:nvSpPr>
+          <p:cNvPr id="28" name="TextBox 27"/>
+          <p:cNvSpPr txBox="1"/>
+          <p:nvPr/>
+        </p:nvSpPr>
+        <p:spPr>
+          <a:xfrm>
+            <a:off x="4000496" y="4988494"/>
+            <a:ext cx="1500198" cy="369332"/>
+          </a:xfrm>
+          <a:prstGeom prst="rect">
+            <a:avLst/>
+          </a:prstGeom>
+          <a:noFill/>
+        </p:spPr>
+        <p:txBody>
+          <a:bodyPr wrap="square" rtlCol="0">
+            <a:spAutoFit/>
+          </a:bodyPr>
+          <a:lstStyle/>
+          <a:p>
+            <a:r>
+              <a:rPr lang="de-DE" dirty="0" smtClean="0"/>
+              <a:t>Kafka MQ</a:t>
+            </a:r>
+            <a:endParaRPr lang="en-US" dirty="0"/>
+          </a:p>
+        </p:txBody>
+      </p:sp>
+      <p:cxnSp>
+        <p:nvCxnSpPr>
+          <p:cNvPr id="30" name="Straight Arrow Connector 29"/>
+          <p:cNvCxnSpPr/>
+          <p:nvPr/>
+        </p:nvCxnSpPr>
+        <p:spPr>
+          <a:xfrm rot="10800000">
+            <a:off x="3428992" y="4000504"/>
+            <a:ext cx="2357454" cy="1588"/>
+          </a:xfrm>
+          <a:prstGeom prst="straightConnector1">
+            <a:avLst/>
+          </a:prstGeom>
+          <a:ln>
+            <a:tailEnd type="arrow"/>
+          </a:ln>
+        </p:spPr>
+        <p:style>
+          <a:lnRef idx="1">
+            <a:schemeClr val="accent1"/>
+          </a:lnRef>
+          <a:fillRef idx="0">
+            <a:schemeClr val="accent1"/>
+          </a:fillRef>
+          <a:effectRef idx="0">
+            <a:schemeClr val="accent1"/>
+          </a:effectRef>
+          <a:fontRef idx="minor">
+            <a:schemeClr val="tx1"/>
+          </a:fontRef>
+        </p:style>
+      </p:cxnSp>
+      <p:sp>
+        <p:nvSpPr>
+          <p:cNvPr id="31" name="TextBox 30"/>
+          <p:cNvSpPr txBox="1"/>
+          <p:nvPr/>
+        </p:nvSpPr>
+        <p:spPr>
+          <a:xfrm>
+            <a:off x="4143372" y="4000504"/>
+            <a:ext cx="2071702" cy="369332"/>
+          </a:xfrm>
+          <a:prstGeom prst="rect">
+            <a:avLst/>
+          </a:prstGeom>
+          <a:noFill/>
+        </p:spPr>
+        <p:txBody>
+          <a:bodyPr wrap="square" rtlCol="0">
+            <a:spAutoFit/>
+          </a:bodyPr>
+          <a:lstStyle/>
+          <a:p>
+            <a:r>
+              <a:rPr lang="de-DE" i="1" dirty="0" smtClean="0"/>
+              <a:t>response</a:t>
+            </a:r>
+            <a:endParaRPr lang="en-US" i="1" dirty="0"/>
+          </a:p>
+        </p:txBody>
+      </p:sp>
+      <p:sp>
+        <p:nvSpPr>
+          <p:cNvPr id="32" name="TextBox 31"/>
+          <p:cNvSpPr txBox="1"/>
+          <p:nvPr/>
+        </p:nvSpPr>
+        <p:spPr>
+          <a:xfrm>
+            <a:off x="4143372" y="5357826"/>
+            <a:ext cx="2071702" cy="369332"/>
+          </a:xfrm>
+          <a:prstGeom prst="rect">
+            <a:avLst/>
+          </a:prstGeom>
+          <a:noFill/>
+        </p:spPr>
+        <p:txBody>
+          <a:bodyPr wrap="square" rtlCol="0">
+            <a:spAutoFit/>
+          </a:bodyPr>
+          <a:lstStyle/>
+          <a:p>
+            <a:r>
+              <a:rPr lang="de-DE" i="1" dirty="0" smtClean="0"/>
+              <a:t>response</a:t>
+            </a:r>
+            <a:endParaRPr lang="en-US" i="1" dirty="0"/>
+          </a:p>
+        </p:txBody>
+      </p:sp>
+      <p:cxnSp>
+        <p:nvCxnSpPr>
+          <p:cNvPr id="34" name="Straight Arrow Connector 33"/>
+          <p:cNvCxnSpPr/>
+          <p:nvPr/>
+        </p:nvCxnSpPr>
+        <p:spPr>
+          <a:xfrm rot="10800000">
+            <a:off x="3428992" y="5429264"/>
+            <a:ext cx="2357454" cy="1588"/>
+          </a:xfrm>
+          <a:prstGeom prst="straightConnector1">
+            <a:avLst/>
+          </a:prstGeom>
+          <a:ln>
+            <a:tailEnd type="arrow"/>
+          </a:ln>
+        </p:spPr>
+        <p:style>
+          <a:lnRef idx="1">
+            <a:schemeClr val="accent1"/>
+          </a:lnRef>
+          <a:fillRef idx="0">
+            <a:schemeClr val="accent1"/>
+          </a:fillRef>
+          <a:effectRef idx="0">
+            <a:schemeClr val="accent1"/>
+          </a:effectRef>
+          <a:fontRef idx="minor">
+            <a:schemeClr val="tx1"/>
+          </a:fontRef>
+        </p:style>
+      </p:cxnSp>
     </p:spTree>
   </p:cSld>
   <p:clrMapOvr>

</xml_diff>